<commit_message>
complete proj2, only report remaining
</commit_message>
<xml_diff>
--- a/proj2_v2/report_template.pptx
+++ b/proj2_v2/report_template.pptx
@@ -1635,7 +1635,7 @@
               </a:spcAft>
               <a:buNone/>
             </a:pPr>
-            <a:endParaRPr/>
+            <a:endParaRPr dirty="0"/>
           </a:p>
         </p:txBody>
       </p:sp>
@@ -6698,10 +6698,10 @@
               <a:buNone/>
             </a:pPr>
             <a:r>
-              <a:rPr lang="en"/>
-              <a:t>&lt;name&gt;</a:t>
+              <a:rPr lang="en-SG" dirty="0"/>
+              <a:t>Jian Yu, Kok</a:t>
             </a:r>
-            <a:endParaRPr/>
+            <a:endParaRPr dirty="0"/>
           </a:p>
           <a:p>
             <a:pPr marL="0" lvl="0" indent="0" algn="ctr" rtl="0">
@@ -6714,10 +6714,10 @@
               <a:buNone/>
             </a:pPr>
             <a:r>
-              <a:rPr lang="en"/>
-              <a:t>&lt;GT email&gt;</a:t>
+              <a:rPr lang="en-SG" dirty="0"/>
+              <a:t>jkok7@gatech.edu</a:t>
             </a:r>
-            <a:endParaRPr/>
+            <a:endParaRPr dirty="0"/>
           </a:p>
           <a:p>
             <a:pPr marL="0" lvl="0" indent="0" algn="ctr" rtl="0">
@@ -6730,26 +6730,18 @@
               <a:buNone/>
             </a:pPr>
             <a:r>
-              <a:rPr lang="en"/>
-              <a:t>&lt;GT username&gt;</a:t>
+              <a:rPr lang="en-SG" dirty="0"/>
+              <a:t>jkok7</a:t>
             </a:r>
-            <a:endParaRPr/>
-          </a:p>
-          <a:p>
-            <a:pPr marL="0" lvl="0" indent="0" algn="ctr" rtl="0">
-              <a:spcBef>
-                <a:spcPts val="0"/>
-              </a:spcBef>
-              <a:spcAft>
-                <a:spcPts val="0"/>
-              </a:spcAft>
-              <a:buNone/>
-            </a:pPr>
+            <a:endParaRPr dirty="0"/>
+          </a:p>
+          <a:p>
+            <a:pPr marL="0" lvl="0" indent="0"/>
             <a:r>
-              <a:rPr lang="en"/>
-              <a:t>&lt;GTID&gt;</a:t>
+              <a:rPr lang="en" dirty="0"/>
+              <a:t>903550380</a:t>
             </a:r>
-            <a:endParaRPr/>
+            <a:endParaRPr dirty="0"/>
           </a:p>
         </p:txBody>
       </p:sp>
@@ -6870,6 +6862,36 @@
           </a:p>
         </p:txBody>
       </p:sp>
+      <p:pic>
+        <p:nvPicPr>
+          <p:cNvPr id="2" name="Picture 1">
+            <a:extLst>
+              <a:ext uri="{FF2B5EF4-FFF2-40B4-BE49-F238E27FC236}">
+                <a16:creationId xmlns:a16="http://schemas.microsoft.com/office/drawing/2014/main" id="{AA6C6114-0921-4BC8-B29F-3AE84B3BDF3B}"/>
+              </a:ext>
+            </a:extLst>
+          </p:cNvPr>
+          <p:cNvPicPr>
+            <a:picLocks noChangeAspect="1"/>
+          </p:cNvPicPr>
+          <p:nvPr/>
+        </p:nvPicPr>
+        <p:blipFill>
+          <a:blip r:embed="rId3"/>
+          <a:stretch>
+            <a:fillRect/>
+          </a:stretch>
+        </p:blipFill>
+        <p:spPr>
+          <a:xfrm>
+            <a:off x="0" y="2286224"/>
+            <a:ext cx="9144000" cy="1148902"/>
+          </a:xfrm>
+          <a:prstGeom prst="rect">
+            <a:avLst/>
+          </a:prstGeom>
+        </p:spPr>
+      </p:pic>
     </p:spTree>
   </p:cSld>
   <p:clrMapOvr>
@@ -6974,6 +6996,33 @@
             <a:r>
               <a:rPr lang="en" dirty="0"/>
               <a:t>&lt;Describe what you have learned in this project. Feel free to include any challenges you ran into.&gt;</a:t>
+            </a:r>
+          </a:p>
+          <a:p>
+            <a:pPr marL="0" lvl="0" indent="0" algn="l" rtl="0">
+              <a:spcBef>
+                <a:spcPts val="0"/>
+              </a:spcBef>
+              <a:spcAft>
+                <a:spcPts val="1600"/>
+              </a:spcAft>
+              <a:buNone/>
+            </a:pPr>
+            <a:endParaRPr lang="en" dirty="0"/>
+          </a:p>
+          <a:p>
+            <a:pPr marL="0" lvl="0" indent="0" algn="l" rtl="0">
+              <a:spcBef>
+                <a:spcPts val="0"/>
+              </a:spcBef>
+              <a:spcAft>
+                <a:spcPts val="1600"/>
+              </a:spcAft>
+              <a:buNone/>
+            </a:pPr>
+            <a:r>
+              <a:rPr lang="en"/>
+              <a:t>Damn this is really hard.</a:t>
             </a:r>
             <a:endParaRPr dirty="0"/>
           </a:p>
@@ -7104,7 +7153,7 @@
         </p:nvSpPr>
         <p:spPr>
           <a:xfrm>
-            <a:off x="4832400" y="1152475"/>
+            <a:off x="4751717" y="145369"/>
             <a:ext cx="3999900" cy="3416400"/>
           </a:xfrm>
           <a:prstGeom prst="rect">
@@ -7140,6 +7189,194 @@
           </a:p>
         </p:txBody>
       </p:sp>
+      <p:pic>
+        <p:nvPicPr>
+          <p:cNvPr id="1026" name="Picture 2">
+            <a:extLst>
+              <a:ext uri="{FF2B5EF4-FFF2-40B4-BE49-F238E27FC236}">
+                <a16:creationId xmlns:a16="http://schemas.microsoft.com/office/drawing/2014/main" id="{F95E4E51-103F-4F3B-A4A2-EF4B5614366E}"/>
+              </a:ext>
+            </a:extLst>
+          </p:cNvPr>
+          <p:cNvPicPr>
+            <a:picLocks noChangeAspect="1" noChangeArrowheads="1"/>
+          </p:cNvPicPr>
+          <p:nvPr/>
+        </p:nvPicPr>
+        <p:blipFill>
+          <a:blip r:embed="rId3">
+            <a:extLst>
+              <a:ext uri="{28A0092B-C50C-407E-A947-70E740481C1C}">
+                <a14:useLocalDpi xmlns:a14="http://schemas.microsoft.com/office/drawing/2010/main" val="0"/>
+              </a:ext>
+            </a:extLst>
+          </a:blip>
+          <a:srcRect/>
+          <a:stretch>
+            <a:fillRect/>
+          </a:stretch>
+        </p:blipFill>
+        <p:spPr bwMode="auto">
+          <a:xfrm>
+            <a:off x="154362" y="1848971"/>
+            <a:ext cx="1990725" cy="2400300"/>
+          </a:xfrm>
+          <a:prstGeom prst="rect">
+            <a:avLst/>
+          </a:prstGeom>
+          <a:noFill/>
+          <a:extLst>
+            <a:ext uri="{909E8E84-426E-40DD-AFC4-6F175D3DCCD1}">
+              <a14:hiddenFill xmlns:a14="http://schemas.microsoft.com/office/drawing/2010/main">
+                <a:solidFill>
+                  <a:srgbClr val="FFFFFF"/>
+                </a:solidFill>
+              </a14:hiddenFill>
+            </a:ext>
+          </a:extLst>
+        </p:spPr>
+      </p:pic>
+      <p:pic>
+        <p:nvPicPr>
+          <p:cNvPr id="1028" name="Picture 4">
+            <a:extLst>
+              <a:ext uri="{FF2B5EF4-FFF2-40B4-BE49-F238E27FC236}">
+                <a16:creationId xmlns:a16="http://schemas.microsoft.com/office/drawing/2014/main" id="{C207BE4C-70A2-4859-8CE4-2341C388367C}"/>
+              </a:ext>
+            </a:extLst>
+          </p:cNvPr>
+          <p:cNvPicPr>
+            <a:picLocks noChangeAspect="1" noChangeArrowheads="1"/>
+          </p:cNvPicPr>
+          <p:nvPr/>
+        </p:nvPicPr>
+        <p:blipFill>
+          <a:blip r:embed="rId4">
+            <a:extLst>
+              <a:ext uri="{28A0092B-C50C-407E-A947-70E740481C1C}">
+                <a14:useLocalDpi xmlns:a14="http://schemas.microsoft.com/office/drawing/2010/main" val="0"/>
+              </a:ext>
+            </a:extLst>
+          </a:blip>
+          <a:srcRect/>
+          <a:stretch>
+            <a:fillRect/>
+          </a:stretch>
+        </p:blipFill>
+        <p:spPr bwMode="auto">
+          <a:xfrm>
+            <a:off x="2145087" y="1848971"/>
+            <a:ext cx="1990725" cy="2400300"/>
+          </a:xfrm>
+          <a:prstGeom prst="rect">
+            <a:avLst/>
+          </a:prstGeom>
+          <a:noFill/>
+          <a:extLst>
+            <a:ext uri="{909E8E84-426E-40DD-AFC4-6F175D3DCCD1}">
+              <a14:hiddenFill xmlns:a14="http://schemas.microsoft.com/office/drawing/2010/main">
+                <a:solidFill>
+                  <a:srgbClr val="FFFFFF"/>
+                </a:solidFill>
+              </a14:hiddenFill>
+            </a:ext>
+          </a:extLst>
+        </p:spPr>
+      </p:pic>
+      <p:pic>
+        <p:nvPicPr>
+          <p:cNvPr id="1030" name="Picture 6">
+            <a:extLst>
+              <a:ext uri="{FF2B5EF4-FFF2-40B4-BE49-F238E27FC236}">
+                <a16:creationId xmlns:a16="http://schemas.microsoft.com/office/drawing/2014/main" id="{0E3290EE-5929-4F76-AC9B-90D2ADC985F9}"/>
+              </a:ext>
+            </a:extLst>
+          </p:cNvPr>
+          <p:cNvPicPr>
+            <a:picLocks noChangeAspect="1" noChangeArrowheads="1"/>
+          </p:cNvPicPr>
+          <p:nvPr/>
+        </p:nvPicPr>
+        <p:blipFill>
+          <a:blip r:embed="rId5">
+            <a:extLst>
+              <a:ext uri="{28A0092B-C50C-407E-A947-70E740481C1C}">
+                <a14:useLocalDpi xmlns:a14="http://schemas.microsoft.com/office/drawing/2010/main" val="0"/>
+              </a:ext>
+            </a:extLst>
+          </a:blip>
+          <a:srcRect/>
+          <a:stretch>
+            <a:fillRect/>
+          </a:stretch>
+        </p:blipFill>
+        <p:spPr bwMode="auto">
+          <a:xfrm>
+            <a:off x="4726584" y="796082"/>
+            <a:ext cx="2649936" cy="2023587"/>
+          </a:xfrm>
+          <a:prstGeom prst="rect">
+            <a:avLst/>
+          </a:prstGeom>
+          <a:noFill/>
+          <a:extLst>
+            <a:ext uri="{909E8E84-426E-40DD-AFC4-6F175D3DCCD1}">
+              <a14:hiddenFill xmlns:a14="http://schemas.microsoft.com/office/drawing/2010/main">
+                <a:solidFill>
+                  <a:srgbClr val="FFFFFF"/>
+                </a:solidFill>
+              </a14:hiddenFill>
+            </a:ext>
+          </a:extLst>
+        </p:spPr>
+      </p:pic>
+      <p:pic>
+        <p:nvPicPr>
+          <p:cNvPr id="1032" name="Picture 8">
+            <a:extLst>
+              <a:ext uri="{FF2B5EF4-FFF2-40B4-BE49-F238E27FC236}">
+                <a16:creationId xmlns:a16="http://schemas.microsoft.com/office/drawing/2014/main" id="{08460A73-EEE7-4E92-9192-F7107D1CBF19}"/>
+              </a:ext>
+            </a:extLst>
+          </p:cNvPr>
+          <p:cNvPicPr>
+            <a:picLocks noChangeAspect="1" noChangeArrowheads="1"/>
+          </p:cNvPicPr>
+          <p:nvPr/>
+        </p:nvPicPr>
+        <p:blipFill>
+          <a:blip r:embed="rId6">
+            <a:extLst>
+              <a:ext uri="{28A0092B-C50C-407E-A947-70E740481C1C}">
+                <a14:useLocalDpi xmlns:a14="http://schemas.microsoft.com/office/drawing/2010/main" val="0"/>
+              </a:ext>
+            </a:extLst>
+          </a:blip>
+          <a:srcRect/>
+          <a:stretch>
+            <a:fillRect/>
+          </a:stretch>
+        </p:blipFill>
+        <p:spPr bwMode="auto">
+          <a:xfrm>
+            <a:off x="4751717" y="2901032"/>
+            <a:ext cx="2786448" cy="2023588"/>
+          </a:xfrm>
+          <a:prstGeom prst="rect">
+            <a:avLst/>
+          </a:prstGeom>
+          <a:noFill/>
+          <a:extLst>
+            <a:ext uri="{909E8E84-426E-40DD-AFC4-6F175D3DCCD1}">
+              <a14:hiddenFill xmlns:a14="http://schemas.microsoft.com/office/drawing/2010/main">
+                <a:solidFill>
+                  <a:srgbClr val="FFFFFF"/>
+                </a:solidFill>
+              </a14:hiddenFill>
+            </a:ext>
+          </a:extLst>
+        </p:spPr>
+      </p:pic>
     </p:spTree>
   </p:cSld>
   <p:clrMapOvr>
@@ -7267,6 +7504,100 @@
           </a:p>
         </p:txBody>
       </p:sp>
+      <p:pic>
+        <p:nvPicPr>
+          <p:cNvPr id="5122" name="Picture 2">
+            <a:extLst>
+              <a:ext uri="{FF2B5EF4-FFF2-40B4-BE49-F238E27FC236}">
+                <a16:creationId xmlns:a16="http://schemas.microsoft.com/office/drawing/2014/main" id="{024607F4-DFF9-4889-AF27-F222D27C1CD9}"/>
+              </a:ext>
+            </a:extLst>
+          </p:cNvPr>
+          <p:cNvPicPr>
+            <a:picLocks noChangeAspect="1" noChangeArrowheads="1"/>
+          </p:cNvPicPr>
+          <p:nvPr/>
+        </p:nvPicPr>
+        <p:blipFill>
+          <a:blip r:embed="rId3">
+            <a:extLst>
+              <a:ext uri="{28A0092B-C50C-407E-A947-70E740481C1C}">
+                <a14:useLocalDpi xmlns:a14="http://schemas.microsoft.com/office/drawing/2010/main" val="0"/>
+              </a:ext>
+            </a:extLst>
+          </a:blip>
+          <a:srcRect/>
+          <a:stretch>
+            <a:fillRect/>
+          </a:stretch>
+        </p:blipFill>
+        <p:spPr bwMode="auto">
+          <a:xfrm>
+            <a:off x="311700" y="1929653"/>
+            <a:ext cx="3486150" cy="2400300"/>
+          </a:xfrm>
+          <a:prstGeom prst="rect">
+            <a:avLst/>
+          </a:prstGeom>
+          <a:noFill/>
+          <a:extLst>
+            <a:ext uri="{909E8E84-426E-40DD-AFC4-6F175D3DCCD1}">
+              <a14:hiddenFill xmlns:a14="http://schemas.microsoft.com/office/drawing/2010/main">
+                <a:solidFill>
+                  <a:srgbClr val="FFFFFF"/>
+                </a:solidFill>
+              </a14:hiddenFill>
+            </a:ext>
+          </a:extLst>
+        </p:spPr>
+      </p:pic>
+      <p:pic>
+        <p:nvPicPr>
+          <p:cNvPr id="5124" name="Picture 4">
+            <a:extLst>
+              <a:ext uri="{FF2B5EF4-FFF2-40B4-BE49-F238E27FC236}">
+                <a16:creationId xmlns:a16="http://schemas.microsoft.com/office/drawing/2014/main" id="{AD6DFB08-B0C2-4F3D-ACF9-01D190E22DFF}"/>
+              </a:ext>
+            </a:extLst>
+          </p:cNvPr>
+          <p:cNvPicPr>
+            <a:picLocks noChangeAspect="1" noChangeArrowheads="1"/>
+          </p:cNvPicPr>
+          <p:nvPr/>
+        </p:nvPicPr>
+        <p:blipFill>
+          <a:blip r:embed="rId4">
+            <a:extLst>
+              <a:ext uri="{28A0092B-C50C-407E-A947-70E740481C1C}">
+                <a14:useLocalDpi xmlns:a14="http://schemas.microsoft.com/office/drawing/2010/main" val="0"/>
+              </a:ext>
+            </a:extLst>
+          </a:blip>
+          <a:srcRect/>
+          <a:stretch>
+            <a:fillRect/>
+          </a:stretch>
+        </p:blipFill>
+        <p:spPr bwMode="auto">
+          <a:xfrm>
+            <a:off x="4311600" y="1929653"/>
+            <a:ext cx="3143250" cy="2400300"/>
+          </a:xfrm>
+          <a:prstGeom prst="rect">
+            <a:avLst/>
+          </a:prstGeom>
+          <a:noFill/>
+          <a:extLst>
+            <a:ext uri="{909E8E84-426E-40DD-AFC4-6F175D3DCCD1}">
+              <a14:hiddenFill xmlns:a14="http://schemas.microsoft.com/office/drawing/2010/main">
+                <a:solidFill>
+                  <a:srgbClr val="FFFFFF"/>
+                </a:solidFill>
+              </a14:hiddenFill>
+            </a:ext>
+          </a:extLst>
+        </p:spPr>
+      </p:pic>
     </p:spTree>
   </p:cSld>
   <p:clrMapOvr>
@@ -7396,7 +7727,158 @@
               </a:spcAft>
               <a:buNone/>
             </a:pPr>
-            <a:endParaRPr b="1" dirty="0"/>
+            <a:r>
+              <a:rPr lang="en-SG" sz="1200" dirty="0"/>
+              <a:t>The original Harris Corner Detector process consist of 3 main steps. </a:t>
+            </a:r>
+          </a:p>
+          <a:p>
+            <a:pPr marL="342900" lvl="0" indent="-342900" algn="l" rtl="0">
+              <a:spcBef>
+                <a:spcPts val="0"/>
+              </a:spcBef>
+              <a:spcAft>
+                <a:spcPts val="0"/>
+              </a:spcAft>
+              <a:buFont typeface="+mj-lt"/>
+              <a:buAutoNum type="arabicPeriod"/>
+            </a:pPr>
+            <a:r>
+              <a:rPr lang="en-SG" sz="1200" dirty="0"/>
+              <a:t>Compute </a:t>
+            </a:r>
+            <a:r>
+              <a:rPr lang="en-SG" sz="1200" dirty="0" err="1"/>
+              <a:t>cornerness</a:t>
+            </a:r>
+            <a:r>
+              <a:rPr lang="en-SG" sz="1200" dirty="0"/>
+              <a:t> score of each image window.</a:t>
+            </a:r>
+          </a:p>
+          <a:p>
+            <a:pPr marL="342900" lvl="0" indent="-342900" algn="l" rtl="0">
+              <a:spcBef>
+                <a:spcPts val="0"/>
+              </a:spcBef>
+              <a:spcAft>
+                <a:spcPts val="0"/>
+              </a:spcAft>
+              <a:buFont typeface="+mj-lt"/>
+              <a:buAutoNum type="arabicPeriod"/>
+            </a:pPr>
+            <a:r>
+              <a:rPr lang="en-SG" sz="1200" dirty="0"/>
+              <a:t>Find points with a larger corner response (f&gt;threshold)</a:t>
+            </a:r>
+          </a:p>
+          <a:p>
+            <a:pPr marL="342900" lvl="0" indent="-342900" algn="l" rtl="0">
+              <a:spcBef>
+                <a:spcPts val="0"/>
+              </a:spcBef>
+              <a:spcAft>
+                <a:spcPts val="0"/>
+              </a:spcAft>
+              <a:buFont typeface="+mj-lt"/>
+              <a:buAutoNum type="arabicPeriod"/>
+            </a:pPr>
+            <a:r>
+              <a:rPr lang="en-SG" sz="1200" dirty="0"/>
+              <a:t>Perform non-maximum suppression.</a:t>
+            </a:r>
+          </a:p>
+          <a:p>
+            <a:pPr marL="0" lvl="0" indent="0" algn="l" rtl="0">
+              <a:spcBef>
+                <a:spcPts val="0"/>
+              </a:spcBef>
+              <a:spcAft>
+                <a:spcPts val="0"/>
+              </a:spcAft>
+              <a:buNone/>
+            </a:pPr>
+            <a:r>
+              <a:rPr lang="en-SG" sz="1200" dirty="0"/>
+              <a:t>Harris net has 5 Layers. Image Gradients, Channel Product, Second Moment Matrix, Corner Response, and NMS layer. </a:t>
+            </a:r>
+          </a:p>
+          <a:p>
+            <a:pPr marL="0" lvl="0" indent="0" algn="l" rtl="0">
+              <a:spcBef>
+                <a:spcPts val="0"/>
+              </a:spcBef>
+              <a:spcAft>
+                <a:spcPts val="0"/>
+              </a:spcAft>
+              <a:buNone/>
+            </a:pPr>
+            <a:r>
+              <a:rPr lang="en-SG" sz="1200" dirty="0"/>
+              <a:t>Image Gradients convert the pixels into gradients, Channel Product computes </a:t>
+            </a:r>
+            <a:r>
+              <a:rPr lang="en-SG" sz="1200" dirty="0" err="1"/>
+              <a:t>Ixx</a:t>
+            </a:r>
+            <a:r>
+              <a:rPr lang="en-SG" sz="1200" dirty="0"/>
+              <a:t>, </a:t>
+            </a:r>
+            <a:r>
+              <a:rPr lang="en-SG" sz="1200" dirty="0" err="1"/>
+              <a:t>Iyy</a:t>
+            </a:r>
+            <a:r>
+              <a:rPr lang="en-SG" sz="1200" dirty="0"/>
+              <a:t> and </a:t>
+            </a:r>
+            <a:r>
+              <a:rPr lang="en-SG" sz="1200" dirty="0" err="1"/>
+              <a:t>Ixy</a:t>
+            </a:r>
+            <a:r>
+              <a:rPr lang="en-SG" sz="1200" dirty="0"/>
+              <a:t>, which will be used by Second Moment Matrix layer to calculate the Second Moment Matrix, which will then be used to estimate the change in appearance in a neighbourhood. </a:t>
+            </a:r>
+          </a:p>
+          <a:p>
+            <a:pPr marL="0" lvl="0" indent="0" algn="l" rtl="0">
+              <a:spcBef>
+                <a:spcPts val="0"/>
+              </a:spcBef>
+              <a:spcAft>
+                <a:spcPts val="0"/>
+              </a:spcAft>
+              <a:buNone/>
+            </a:pPr>
+            <a:r>
+              <a:rPr lang="en-SG" sz="1200" dirty="0"/>
+              <a:t>The NMS layer will then set all points with value &lt; threshold(median) to 0, and perform non-maximum suppression.</a:t>
+            </a:r>
+          </a:p>
+          <a:p>
+            <a:pPr marL="0" lvl="0" indent="0" algn="l" rtl="0">
+              <a:spcBef>
+                <a:spcPts val="0"/>
+              </a:spcBef>
+              <a:spcAft>
+                <a:spcPts val="0"/>
+              </a:spcAft>
+              <a:buNone/>
+            </a:pPr>
+            <a:r>
+              <a:rPr lang="en-SG" sz="1200" dirty="0"/>
+              <a:t>From this, it can be said that Image Gradients, Channel Product, Second Moment Matrix and Corner Response layers corresponds to Step 1 as they are used to calculate the </a:t>
+            </a:r>
+            <a:r>
+              <a:rPr lang="en-SG" sz="1200" dirty="0" err="1"/>
+              <a:t>cornerness</a:t>
+            </a:r>
+            <a:r>
+              <a:rPr lang="en-SG" sz="1200" dirty="0"/>
+              <a:t> score, and the NMS Layer corresponds to step 2 and 3.</a:t>
+            </a:r>
           </a:p>
         </p:txBody>
       </p:sp>
@@ -7683,6 +8165,100 @@
           </a:p>
         </p:txBody>
       </p:sp>
+      <p:pic>
+        <p:nvPicPr>
+          <p:cNvPr id="2052" name="Picture 4">
+            <a:extLst>
+              <a:ext uri="{FF2B5EF4-FFF2-40B4-BE49-F238E27FC236}">
+                <a16:creationId xmlns:a16="http://schemas.microsoft.com/office/drawing/2014/main" id="{0361BBE4-4274-46A6-9B6C-398A7E804FD3}"/>
+              </a:ext>
+            </a:extLst>
+          </p:cNvPr>
+          <p:cNvPicPr>
+            <a:picLocks noChangeAspect="1" noChangeArrowheads="1"/>
+          </p:cNvPicPr>
+          <p:nvPr/>
+        </p:nvPicPr>
+        <p:blipFill>
+          <a:blip r:embed="rId3">
+            <a:extLst>
+              <a:ext uri="{28A0092B-C50C-407E-A947-70E740481C1C}">
+                <a14:useLocalDpi xmlns:a14="http://schemas.microsoft.com/office/drawing/2010/main" val="0"/>
+              </a:ext>
+            </a:extLst>
+          </a:blip>
+          <a:srcRect/>
+          <a:stretch>
+            <a:fillRect/>
+          </a:stretch>
+        </p:blipFill>
+        <p:spPr bwMode="auto">
+          <a:xfrm>
+            <a:off x="256895" y="2104465"/>
+            <a:ext cx="3533775" cy="2400300"/>
+          </a:xfrm>
+          <a:prstGeom prst="rect">
+            <a:avLst/>
+          </a:prstGeom>
+          <a:noFill/>
+          <a:extLst>
+            <a:ext uri="{909E8E84-426E-40DD-AFC4-6F175D3DCCD1}">
+              <a14:hiddenFill xmlns:a14="http://schemas.microsoft.com/office/drawing/2010/main">
+                <a:solidFill>
+                  <a:srgbClr val="FFFFFF"/>
+                </a:solidFill>
+              </a14:hiddenFill>
+            </a:ext>
+          </a:extLst>
+        </p:spPr>
+      </p:pic>
+      <p:pic>
+        <p:nvPicPr>
+          <p:cNvPr id="2054" name="Picture 6">
+            <a:extLst>
+              <a:ext uri="{FF2B5EF4-FFF2-40B4-BE49-F238E27FC236}">
+                <a16:creationId xmlns:a16="http://schemas.microsoft.com/office/drawing/2014/main" id="{B1094B04-447A-4232-9944-12BF8D377854}"/>
+              </a:ext>
+            </a:extLst>
+          </p:cNvPr>
+          <p:cNvPicPr>
+            <a:picLocks noChangeAspect="1" noChangeArrowheads="1"/>
+          </p:cNvPicPr>
+          <p:nvPr/>
+        </p:nvPicPr>
+        <p:blipFill>
+          <a:blip r:embed="rId4">
+            <a:extLst>
+              <a:ext uri="{28A0092B-C50C-407E-A947-70E740481C1C}">
+                <a14:useLocalDpi xmlns:a14="http://schemas.microsoft.com/office/drawing/2010/main" val="0"/>
+              </a:ext>
+            </a:extLst>
+          </a:blip>
+          <a:srcRect/>
+          <a:stretch>
+            <a:fillRect/>
+          </a:stretch>
+        </p:blipFill>
+        <p:spPr bwMode="auto">
+          <a:xfrm>
+            <a:off x="4700588" y="2409875"/>
+            <a:ext cx="3629025" cy="1581150"/>
+          </a:xfrm>
+          <a:prstGeom prst="rect">
+            <a:avLst/>
+          </a:prstGeom>
+          <a:noFill/>
+          <a:extLst>
+            <a:ext uri="{909E8E84-426E-40DD-AFC4-6F175D3DCCD1}">
+              <a14:hiddenFill xmlns:a14="http://schemas.microsoft.com/office/drawing/2010/main">
+                <a:solidFill>
+                  <a:srgbClr val="FFFFFF"/>
+                </a:solidFill>
+              </a14:hiddenFill>
+            </a:ext>
+          </a:extLst>
+        </p:spPr>
+      </p:pic>
     </p:spTree>
   </p:cSld>
   <p:clrMapOvr>
@@ -7848,10 +8424,162 @@
               <a:rPr lang="en-US" dirty="0"/>
               <a:t>&lt;Describe your implementation of feature matching.&gt;</a:t>
             </a:r>
-            <a:endParaRPr dirty="0"/>
+          </a:p>
+          <a:p>
+            <a:pPr marL="285750" indent="-285750">
+              <a:buFont typeface="+mj-lt"/>
+              <a:buAutoNum type="arabicPeriod"/>
+            </a:pPr>
+            <a:r>
+              <a:rPr lang="en-US" sz="1100" dirty="0"/>
+              <a:t>Firstly, I computed the distances between all features in features1 and features2.</a:t>
+            </a:r>
+          </a:p>
+          <a:p>
+            <a:pPr marL="285750" indent="-285750">
+              <a:buFont typeface="+mj-lt"/>
+              <a:buAutoNum type="arabicPeriod"/>
+            </a:pPr>
+            <a:r>
+              <a:rPr lang="en-US" sz="1100" dirty="0"/>
+              <a:t>For every features in features1, retrieve the 2 features in features2 which it has the smallest and 2</a:t>
+            </a:r>
+            <a:r>
+              <a:rPr lang="en-US" sz="1100" baseline="30000" dirty="0"/>
+              <a:t>nd</a:t>
+            </a:r>
+            <a:r>
+              <a:rPr lang="en-US" sz="1100" dirty="0"/>
+              <a:t> smallest distance with.</a:t>
+            </a:r>
+          </a:p>
+          <a:p>
+            <a:pPr marL="285750" indent="-285750">
+              <a:buFont typeface="+mj-lt"/>
+              <a:buAutoNum type="arabicPeriod"/>
+            </a:pPr>
+            <a:r>
+              <a:rPr lang="en-US" sz="1100" dirty="0"/>
+              <a:t>Calculate nearest neighbor distance ratio(NNDR) for features in feature1 by dividing the smallest distance with 2</a:t>
+            </a:r>
+            <a:r>
+              <a:rPr lang="en-US" sz="1100" baseline="30000" dirty="0"/>
+              <a:t>nd</a:t>
+            </a:r>
+            <a:r>
+              <a:rPr lang="en-US" sz="1100" dirty="0"/>
+              <a:t> smallest distance. </a:t>
+            </a:r>
+          </a:p>
+          <a:p>
+            <a:pPr marL="285750" indent="-285750">
+              <a:buFont typeface="+mj-lt"/>
+              <a:buAutoNum type="arabicPeriod"/>
+            </a:pPr>
+            <a:r>
+              <a:rPr lang="en-US" sz="1100" dirty="0"/>
+              <a:t>Sort features1 with the nearest neighbor distance ratio. </a:t>
+            </a:r>
+          </a:p>
+          <a:p>
+            <a:pPr marL="285750" indent="-285750">
+              <a:buFont typeface="+mj-lt"/>
+              <a:buAutoNum type="arabicPeriod"/>
+            </a:pPr>
+            <a:r>
+              <a:rPr lang="en-US" sz="1100" dirty="0"/>
+              <a:t>Filter out features if it has a NNDR of &lt;= 0.8</a:t>
+            </a:r>
+          </a:p>
+          <a:p>
+            <a:pPr marL="285750" indent="-285750">
+              <a:buFont typeface="+mj-lt"/>
+              <a:buAutoNum type="arabicPeriod"/>
+            </a:pPr>
+            <a:r>
+              <a:rPr lang="en-US" sz="1100" dirty="0"/>
+              <a:t>Create matches array, </a:t>
+            </a:r>
+            <a:r>
+              <a:rPr lang="en-SG" sz="1100" dirty="0"/>
+              <a:t>where first column is features in feature1 sorted by NNDR, and second column is the corresponding feature in features2 with the smallest distance to the feature in column1.</a:t>
+            </a:r>
+          </a:p>
+          <a:p>
+            <a:pPr marL="285750" indent="-285750">
+              <a:buFont typeface="+mj-lt"/>
+              <a:buAutoNum type="arabicPeriod"/>
+            </a:pPr>
+            <a:r>
+              <a:rPr lang="en-US" sz="1100" dirty="0"/>
+              <a:t>Set confidences as NNDR sorted, with all values &lt;= 0.8 filtered.</a:t>
+            </a:r>
+          </a:p>
+          <a:p>
+            <a:pPr marL="285750" indent="-285750">
+              <a:buFont typeface="+mj-lt"/>
+              <a:buAutoNum type="arabicPeriod"/>
+            </a:pPr>
+            <a:r>
+              <a:rPr lang="en-US" sz="1100" dirty="0"/>
+              <a:t>Return matches and confidences</a:t>
+            </a:r>
+          </a:p>
+          <a:p>
+            <a:pPr marL="0" lvl="0" indent="0">
+              <a:buNone/>
+            </a:pPr>
+            <a:endParaRPr lang="en-US" dirty="0"/>
           </a:p>
         </p:txBody>
       </p:sp>
+      <p:pic>
+        <p:nvPicPr>
+          <p:cNvPr id="4100" name="Picture 4">
+            <a:extLst>
+              <a:ext uri="{FF2B5EF4-FFF2-40B4-BE49-F238E27FC236}">
+                <a16:creationId xmlns:a16="http://schemas.microsoft.com/office/drawing/2014/main" id="{3B4C7A35-78A0-44F9-867F-4DCE3D5B7B34}"/>
+              </a:ext>
+            </a:extLst>
+          </p:cNvPr>
+          <p:cNvPicPr>
+            <a:picLocks noChangeAspect="1" noChangeArrowheads="1"/>
+          </p:cNvPicPr>
+          <p:nvPr/>
+        </p:nvPicPr>
+        <p:blipFill>
+          <a:blip r:embed="rId3">
+            <a:extLst>
+              <a:ext uri="{28A0092B-C50C-407E-A947-70E740481C1C}">
+                <a14:useLocalDpi xmlns:a14="http://schemas.microsoft.com/office/drawing/2010/main" val="0"/>
+              </a:ext>
+            </a:extLst>
+          </a:blip>
+          <a:srcRect/>
+          <a:stretch>
+            <a:fillRect/>
+          </a:stretch>
+        </p:blipFill>
+        <p:spPr bwMode="auto">
+          <a:xfrm>
+            <a:off x="311700" y="2215683"/>
+            <a:ext cx="3571875" cy="1666875"/>
+          </a:xfrm>
+          <a:prstGeom prst="rect">
+            <a:avLst/>
+          </a:prstGeom>
+          <a:noFill/>
+          <a:extLst>
+            <a:ext uri="{909E8E84-426E-40DD-AFC4-6F175D3DCCD1}">
+              <a14:hiddenFill xmlns:a14="http://schemas.microsoft.com/office/drawing/2010/main">
+                <a:solidFill>
+                  <a:srgbClr val="FFFFFF"/>
+                </a:solidFill>
+              </a14:hiddenFill>
+            </a:ext>
+          </a:extLst>
+        </p:spPr>
+      </p:pic>
     </p:spTree>
   </p:cSld>
   <p:clrMapOvr>
@@ -7998,6 +8726,100 @@
           </a:p>
         </p:txBody>
       </p:sp>
+      <p:pic>
+        <p:nvPicPr>
+          <p:cNvPr id="3074" name="Picture 2">
+            <a:extLst>
+              <a:ext uri="{FF2B5EF4-FFF2-40B4-BE49-F238E27FC236}">
+                <a16:creationId xmlns:a16="http://schemas.microsoft.com/office/drawing/2014/main" id="{6E51000E-0EC4-479B-9390-7A2AC97416AC}"/>
+              </a:ext>
+            </a:extLst>
+          </p:cNvPr>
+          <p:cNvPicPr>
+            <a:picLocks noChangeAspect="1" noChangeArrowheads="1"/>
+          </p:cNvPicPr>
+          <p:nvPr/>
+        </p:nvPicPr>
+        <p:blipFill>
+          <a:blip r:embed="rId3">
+            <a:extLst>
+              <a:ext uri="{28A0092B-C50C-407E-A947-70E740481C1C}">
+                <a14:useLocalDpi xmlns:a14="http://schemas.microsoft.com/office/drawing/2010/main" val="0"/>
+              </a:ext>
+            </a:extLst>
+          </a:blip>
+          <a:srcRect/>
+          <a:stretch>
+            <a:fillRect/>
+          </a:stretch>
+        </p:blipFill>
+        <p:spPr bwMode="auto">
+          <a:xfrm>
+            <a:off x="364471" y="2298175"/>
+            <a:ext cx="3533775" cy="2400300"/>
+          </a:xfrm>
+          <a:prstGeom prst="rect">
+            <a:avLst/>
+          </a:prstGeom>
+          <a:noFill/>
+          <a:extLst>
+            <a:ext uri="{909E8E84-426E-40DD-AFC4-6F175D3DCCD1}">
+              <a14:hiddenFill xmlns:a14="http://schemas.microsoft.com/office/drawing/2010/main">
+                <a:solidFill>
+                  <a:srgbClr val="FFFFFF"/>
+                </a:solidFill>
+              </a14:hiddenFill>
+            </a:ext>
+          </a:extLst>
+        </p:spPr>
+      </p:pic>
+      <p:pic>
+        <p:nvPicPr>
+          <p:cNvPr id="6" name="Picture 2">
+            <a:extLst>
+              <a:ext uri="{FF2B5EF4-FFF2-40B4-BE49-F238E27FC236}">
+                <a16:creationId xmlns:a16="http://schemas.microsoft.com/office/drawing/2014/main" id="{6F379883-0784-4366-8F75-03FEAC86B731}"/>
+              </a:ext>
+            </a:extLst>
+          </p:cNvPr>
+          <p:cNvPicPr>
+            <a:picLocks noChangeAspect="1" noChangeArrowheads="1"/>
+          </p:cNvPicPr>
+          <p:nvPr/>
+        </p:nvPicPr>
+        <p:blipFill>
+          <a:blip r:embed="rId4">
+            <a:extLst>
+              <a:ext uri="{28A0092B-C50C-407E-A947-70E740481C1C}">
+                <a14:useLocalDpi xmlns:a14="http://schemas.microsoft.com/office/drawing/2010/main" val="0"/>
+              </a:ext>
+            </a:extLst>
+          </a:blip>
+          <a:srcRect/>
+          <a:stretch>
+            <a:fillRect/>
+          </a:stretch>
+        </p:blipFill>
+        <p:spPr bwMode="auto">
+          <a:xfrm>
+            <a:off x="4754377" y="2298175"/>
+            <a:ext cx="3629025" cy="1581150"/>
+          </a:xfrm>
+          <a:prstGeom prst="rect">
+            <a:avLst/>
+          </a:prstGeom>
+          <a:noFill/>
+          <a:extLst>
+            <a:ext uri="{909E8E84-426E-40DD-AFC4-6F175D3DCCD1}">
+              <a14:hiddenFill xmlns:a14="http://schemas.microsoft.com/office/drawing/2010/main">
+                <a:solidFill>
+                  <a:srgbClr val="FFFFFF"/>
+                </a:solidFill>
+              </a14:hiddenFill>
+            </a:ext>
+          </a:extLst>
+        </p:spPr>
+      </p:pic>
     </p:spTree>
   </p:cSld>
   <p:clrMapOvr>
@@ -8164,6 +8986,53 @@
           </a:p>
         </p:txBody>
       </p:sp>
+      <p:pic>
+        <p:nvPicPr>
+          <p:cNvPr id="6146" name="Picture 2">
+            <a:extLst>
+              <a:ext uri="{FF2B5EF4-FFF2-40B4-BE49-F238E27FC236}">
+                <a16:creationId xmlns:a16="http://schemas.microsoft.com/office/drawing/2014/main" id="{364510A2-57CC-4A42-A70F-E36A735B0819}"/>
+              </a:ext>
+            </a:extLst>
+          </p:cNvPr>
+          <p:cNvPicPr>
+            <a:picLocks noChangeAspect="1" noChangeArrowheads="1"/>
+          </p:cNvPicPr>
+          <p:nvPr/>
+        </p:nvPicPr>
+        <p:blipFill>
+          <a:blip r:embed="rId3">
+            <a:extLst>
+              <a:ext uri="{28A0092B-C50C-407E-A947-70E740481C1C}">
+                <a14:useLocalDpi xmlns:a14="http://schemas.microsoft.com/office/drawing/2010/main" val="0"/>
+              </a:ext>
+            </a:extLst>
+          </a:blip>
+          <a:srcRect/>
+          <a:stretch>
+            <a:fillRect/>
+          </a:stretch>
+        </p:blipFill>
+        <p:spPr bwMode="auto">
+          <a:xfrm>
+            <a:off x="237845" y="2242577"/>
+            <a:ext cx="3571875" cy="1666875"/>
+          </a:xfrm>
+          <a:prstGeom prst="rect">
+            <a:avLst/>
+          </a:prstGeom>
+          <a:noFill/>
+          <a:extLst>
+            <a:ext uri="{909E8E84-426E-40DD-AFC4-6F175D3DCCD1}">
+              <a14:hiddenFill xmlns:a14="http://schemas.microsoft.com/office/drawing/2010/main">
+                <a:solidFill>
+                  <a:srgbClr val="FFFFFF"/>
+                </a:solidFill>
+              </a14:hiddenFill>
+            </a:ext>
+          </a:extLst>
+        </p:spPr>
+      </p:pic>
     </p:spTree>
   </p:cSld>
   <p:clrMapOvr>

</xml_diff>